<commit_message>
change git tutorial referenced
</commit_message>
<xml_diff>
--- a/app/ModelEvaluation.pptx
+++ b/app/ModelEvaluation.pptx
@@ -211,7 +211,7 @@
           <a:p>
             <a:fld id="{88131A8B-105A-4C0E-9134-444983FAD36F}" type="datetimeFigureOut">
               <a:rPr lang="en-US" smtClean="0"/>
-              <a:t>11/29/2018</a:t>
+              <a:t>12/12/2018</a:t>
             </a:fld>
             <a:endParaRPr lang="en-US"/>
           </a:p>
@@ -275,38 +275,37 @@
           <a:p>
             <a:pPr lvl="0"/>
             <a:r>
-              <a:rPr lang="en-US" smtClean="0"/>
+              <a:rPr lang="en-US"/>
               <a:t>Click to edit Master text styles</a:t>
             </a:r>
           </a:p>
           <a:p>
             <a:pPr lvl="1"/>
             <a:r>
-              <a:rPr lang="en-US" smtClean="0"/>
+              <a:rPr lang="en-US"/>
               <a:t>Second level</a:t>
             </a:r>
           </a:p>
           <a:p>
             <a:pPr lvl="2"/>
             <a:r>
-              <a:rPr lang="en-US" smtClean="0"/>
+              <a:rPr lang="en-US"/>
               <a:t>Third level</a:t>
             </a:r>
           </a:p>
           <a:p>
             <a:pPr lvl="3"/>
             <a:r>
-              <a:rPr lang="en-US" smtClean="0"/>
+              <a:rPr lang="en-US"/>
               <a:t>Fourth level</a:t>
             </a:r>
           </a:p>
           <a:p>
             <a:pPr lvl="4"/>
             <a:r>
-              <a:rPr lang="en-US" smtClean="0"/>
+              <a:rPr lang="en-US"/>
               <a:t>Fifth level</a:t>
             </a:r>
-            <a:endParaRPr lang="en-US"/>
           </a:p>
         </p:txBody>
       </p:sp>
@@ -785,7 +784,7 @@
           <p:cNvPr id="2" name="Title 1">
             <a:extLst>
               <a:ext uri="{FF2B5EF4-FFF2-40B4-BE49-F238E27FC236}">
-                <a16:creationId xmlns:a16="http://schemas.microsoft.com/office/drawing/2014/main" xmlns="" id="{098D6E2D-06CB-5B4C-AD83-311ABD1680BE}"/>
+                <a16:creationId xmlns:a16="http://schemas.microsoft.com/office/drawing/2014/main" id="{098D6E2D-06CB-5B4C-AD83-311ABD1680BE}"/>
               </a:ext>
             </a:extLst>
           </p:cNvPr>
@@ -822,7 +821,7 @@
           <p:cNvPr id="3" name="Subtitle 2">
             <a:extLst>
               <a:ext uri="{FF2B5EF4-FFF2-40B4-BE49-F238E27FC236}">
-                <a16:creationId xmlns:a16="http://schemas.microsoft.com/office/drawing/2014/main" xmlns="" id="{1206601C-DD0F-E645-BAA5-DA88CA5DBCC3}"/>
+                <a16:creationId xmlns:a16="http://schemas.microsoft.com/office/drawing/2014/main" id="{1206601C-DD0F-E645-BAA5-DA88CA5DBCC3}"/>
               </a:ext>
             </a:extLst>
           </p:cNvPr>
@@ -892,7 +891,7 @@
           <p:cNvPr id="4" name="Date Placeholder 3">
             <a:extLst>
               <a:ext uri="{FF2B5EF4-FFF2-40B4-BE49-F238E27FC236}">
-                <a16:creationId xmlns:a16="http://schemas.microsoft.com/office/drawing/2014/main" xmlns="" id="{16A18FE8-FEF9-CD40-AA5C-36452CC4C2D2}"/>
+                <a16:creationId xmlns:a16="http://schemas.microsoft.com/office/drawing/2014/main" id="{16A18FE8-FEF9-CD40-AA5C-36452CC4C2D2}"/>
               </a:ext>
             </a:extLst>
           </p:cNvPr>
@@ -910,7 +909,7 @@
           <a:p>
             <a:fld id="{535F16BF-3CF2-8C4D-A235-C33F2149ABED}" type="datetimeFigureOut">
               <a:rPr lang="en-US" smtClean="0"/>
-              <a:t>11/29/2018</a:t>
+              <a:t>12/12/2018</a:t>
             </a:fld>
             <a:endParaRPr lang="en-US"/>
           </a:p>
@@ -921,7 +920,7 @@
           <p:cNvPr id="5" name="Footer Placeholder 4">
             <a:extLst>
               <a:ext uri="{FF2B5EF4-FFF2-40B4-BE49-F238E27FC236}">
-                <a16:creationId xmlns:a16="http://schemas.microsoft.com/office/drawing/2014/main" xmlns="" id="{B0880C94-A419-A142-AAEE-F69EC0B40C8B}"/>
+                <a16:creationId xmlns:a16="http://schemas.microsoft.com/office/drawing/2014/main" id="{B0880C94-A419-A142-AAEE-F69EC0B40C8B}"/>
               </a:ext>
             </a:extLst>
           </p:cNvPr>
@@ -946,7 +945,7 @@
           <p:cNvPr id="6" name="Slide Number Placeholder 5">
             <a:extLst>
               <a:ext uri="{FF2B5EF4-FFF2-40B4-BE49-F238E27FC236}">
-                <a16:creationId xmlns:a16="http://schemas.microsoft.com/office/drawing/2014/main" xmlns="" id="{619ABE37-D95A-B045-B8ED-C636FAA7A0DF}"/>
+                <a16:creationId xmlns:a16="http://schemas.microsoft.com/office/drawing/2014/main" id="{619ABE37-D95A-B045-B8ED-C636FAA7A0DF}"/>
               </a:ext>
             </a:extLst>
           </p:cNvPr>
@@ -1005,7 +1004,7 @@
           <p:cNvPr id="2" name="Title 1">
             <a:extLst>
               <a:ext uri="{FF2B5EF4-FFF2-40B4-BE49-F238E27FC236}">
-                <a16:creationId xmlns:a16="http://schemas.microsoft.com/office/drawing/2014/main" xmlns="" id="{DA99F3F6-5382-0749-92C1-FCCDD4A53A41}"/>
+                <a16:creationId xmlns:a16="http://schemas.microsoft.com/office/drawing/2014/main" id="{DA99F3F6-5382-0749-92C1-FCCDD4A53A41}"/>
               </a:ext>
             </a:extLst>
           </p:cNvPr>
@@ -1033,7 +1032,7 @@
           <p:cNvPr id="3" name="Vertical Text Placeholder 2">
             <a:extLst>
               <a:ext uri="{FF2B5EF4-FFF2-40B4-BE49-F238E27FC236}">
-                <a16:creationId xmlns:a16="http://schemas.microsoft.com/office/drawing/2014/main" xmlns="" id="{7BB72519-AFE1-C344-8887-ADF0E39572F5}"/>
+                <a16:creationId xmlns:a16="http://schemas.microsoft.com/office/drawing/2014/main" id="{7BB72519-AFE1-C344-8887-ADF0E39572F5}"/>
               </a:ext>
             </a:extLst>
           </p:cNvPr>
@@ -1090,7 +1089,7 @@
           <p:cNvPr id="4" name="Date Placeholder 3">
             <a:extLst>
               <a:ext uri="{FF2B5EF4-FFF2-40B4-BE49-F238E27FC236}">
-                <a16:creationId xmlns:a16="http://schemas.microsoft.com/office/drawing/2014/main" xmlns="" id="{115AC6B2-F66C-D141-8BBD-3D95822B6AD9}"/>
+                <a16:creationId xmlns:a16="http://schemas.microsoft.com/office/drawing/2014/main" id="{115AC6B2-F66C-D141-8BBD-3D95822B6AD9}"/>
               </a:ext>
             </a:extLst>
           </p:cNvPr>
@@ -1108,7 +1107,7 @@
           <a:p>
             <a:fld id="{535F16BF-3CF2-8C4D-A235-C33F2149ABED}" type="datetimeFigureOut">
               <a:rPr lang="en-US" smtClean="0"/>
-              <a:t>11/29/2018</a:t>
+              <a:t>12/12/2018</a:t>
             </a:fld>
             <a:endParaRPr lang="en-US"/>
           </a:p>
@@ -1119,7 +1118,7 @@
           <p:cNvPr id="5" name="Footer Placeholder 4">
             <a:extLst>
               <a:ext uri="{FF2B5EF4-FFF2-40B4-BE49-F238E27FC236}">
-                <a16:creationId xmlns:a16="http://schemas.microsoft.com/office/drawing/2014/main" xmlns="" id="{B8DC2A5B-45EF-9C4D-AC8E-911731585885}"/>
+                <a16:creationId xmlns:a16="http://schemas.microsoft.com/office/drawing/2014/main" id="{B8DC2A5B-45EF-9C4D-AC8E-911731585885}"/>
               </a:ext>
             </a:extLst>
           </p:cNvPr>
@@ -1144,7 +1143,7 @@
           <p:cNvPr id="6" name="Slide Number Placeholder 5">
             <a:extLst>
               <a:ext uri="{FF2B5EF4-FFF2-40B4-BE49-F238E27FC236}">
-                <a16:creationId xmlns:a16="http://schemas.microsoft.com/office/drawing/2014/main" xmlns="" id="{0647CA4A-D0BA-D849-A336-3B399E75D1F0}"/>
+                <a16:creationId xmlns:a16="http://schemas.microsoft.com/office/drawing/2014/main" id="{0647CA4A-D0BA-D849-A336-3B399E75D1F0}"/>
               </a:ext>
             </a:extLst>
           </p:cNvPr>
@@ -1203,7 +1202,7 @@
           <p:cNvPr id="2" name="Vertical Title 1">
             <a:extLst>
               <a:ext uri="{FF2B5EF4-FFF2-40B4-BE49-F238E27FC236}">
-                <a16:creationId xmlns:a16="http://schemas.microsoft.com/office/drawing/2014/main" xmlns="" id="{3AA10E06-4B1A-0349-8BFE-BEBBD49F85A5}"/>
+                <a16:creationId xmlns:a16="http://schemas.microsoft.com/office/drawing/2014/main" id="{3AA10E06-4B1A-0349-8BFE-BEBBD49F85A5}"/>
               </a:ext>
             </a:extLst>
           </p:cNvPr>
@@ -1236,7 +1235,7 @@
           <p:cNvPr id="3" name="Vertical Text Placeholder 2">
             <a:extLst>
               <a:ext uri="{FF2B5EF4-FFF2-40B4-BE49-F238E27FC236}">
-                <a16:creationId xmlns:a16="http://schemas.microsoft.com/office/drawing/2014/main" xmlns="" id="{C335A256-ED3E-4F4B-A5A0-4D980932386A}"/>
+                <a16:creationId xmlns:a16="http://schemas.microsoft.com/office/drawing/2014/main" id="{C335A256-ED3E-4F4B-A5A0-4D980932386A}"/>
               </a:ext>
             </a:extLst>
           </p:cNvPr>
@@ -1298,7 +1297,7 @@
           <p:cNvPr id="4" name="Date Placeholder 3">
             <a:extLst>
               <a:ext uri="{FF2B5EF4-FFF2-40B4-BE49-F238E27FC236}">
-                <a16:creationId xmlns:a16="http://schemas.microsoft.com/office/drawing/2014/main" xmlns="" id="{6D731BAC-C06E-C744-9517-D578037C1FCC}"/>
+                <a16:creationId xmlns:a16="http://schemas.microsoft.com/office/drawing/2014/main" id="{6D731BAC-C06E-C744-9517-D578037C1FCC}"/>
               </a:ext>
             </a:extLst>
           </p:cNvPr>
@@ -1316,7 +1315,7 @@
           <a:p>
             <a:fld id="{535F16BF-3CF2-8C4D-A235-C33F2149ABED}" type="datetimeFigureOut">
               <a:rPr lang="en-US" smtClean="0"/>
-              <a:t>11/29/2018</a:t>
+              <a:t>12/12/2018</a:t>
             </a:fld>
             <a:endParaRPr lang="en-US"/>
           </a:p>
@@ -1327,7 +1326,7 @@
           <p:cNvPr id="5" name="Footer Placeholder 4">
             <a:extLst>
               <a:ext uri="{FF2B5EF4-FFF2-40B4-BE49-F238E27FC236}">
-                <a16:creationId xmlns:a16="http://schemas.microsoft.com/office/drawing/2014/main" xmlns="" id="{25128E72-4609-1444-9832-AC5F1DEC8048}"/>
+                <a16:creationId xmlns:a16="http://schemas.microsoft.com/office/drawing/2014/main" id="{25128E72-4609-1444-9832-AC5F1DEC8048}"/>
               </a:ext>
             </a:extLst>
           </p:cNvPr>
@@ -1352,7 +1351,7 @@
           <p:cNvPr id="6" name="Slide Number Placeholder 5">
             <a:extLst>
               <a:ext uri="{FF2B5EF4-FFF2-40B4-BE49-F238E27FC236}">
-                <a16:creationId xmlns:a16="http://schemas.microsoft.com/office/drawing/2014/main" xmlns="" id="{A1DA9EF5-993A-3241-B1E3-016A36469EC6}"/>
+                <a16:creationId xmlns:a16="http://schemas.microsoft.com/office/drawing/2014/main" id="{A1DA9EF5-993A-3241-B1E3-016A36469EC6}"/>
               </a:ext>
             </a:extLst>
           </p:cNvPr>
@@ -1411,7 +1410,7 @@
           <p:cNvPr id="2" name="Title 1">
             <a:extLst>
               <a:ext uri="{FF2B5EF4-FFF2-40B4-BE49-F238E27FC236}">
-                <a16:creationId xmlns:a16="http://schemas.microsoft.com/office/drawing/2014/main" xmlns="" id="{524E20C2-91F2-F941-800C-3481EC1B8640}"/>
+                <a16:creationId xmlns:a16="http://schemas.microsoft.com/office/drawing/2014/main" id="{524E20C2-91F2-F941-800C-3481EC1B8640}"/>
               </a:ext>
             </a:extLst>
           </p:cNvPr>
@@ -1439,7 +1438,7 @@
           <p:cNvPr id="3" name="Content Placeholder 2">
             <a:extLst>
               <a:ext uri="{FF2B5EF4-FFF2-40B4-BE49-F238E27FC236}">
-                <a16:creationId xmlns:a16="http://schemas.microsoft.com/office/drawing/2014/main" xmlns="" id="{34248C73-51CF-D141-81B1-75E88769692E}"/>
+                <a16:creationId xmlns:a16="http://schemas.microsoft.com/office/drawing/2014/main" id="{34248C73-51CF-D141-81B1-75E88769692E}"/>
               </a:ext>
             </a:extLst>
           </p:cNvPr>
@@ -1496,7 +1495,7 @@
           <p:cNvPr id="4" name="Date Placeholder 3">
             <a:extLst>
               <a:ext uri="{FF2B5EF4-FFF2-40B4-BE49-F238E27FC236}">
-                <a16:creationId xmlns:a16="http://schemas.microsoft.com/office/drawing/2014/main" xmlns="" id="{12BBC658-AD23-2D4B-B3A2-3A6BCCF5D192}"/>
+                <a16:creationId xmlns:a16="http://schemas.microsoft.com/office/drawing/2014/main" id="{12BBC658-AD23-2D4B-B3A2-3A6BCCF5D192}"/>
               </a:ext>
             </a:extLst>
           </p:cNvPr>
@@ -1514,7 +1513,7 @@
           <a:p>
             <a:fld id="{535F16BF-3CF2-8C4D-A235-C33F2149ABED}" type="datetimeFigureOut">
               <a:rPr lang="en-US" smtClean="0"/>
-              <a:t>11/29/2018</a:t>
+              <a:t>12/12/2018</a:t>
             </a:fld>
             <a:endParaRPr lang="en-US"/>
           </a:p>
@@ -1525,7 +1524,7 @@
           <p:cNvPr id="5" name="Footer Placeholder 4">
             <a:extLst>
               <a:ext uri="{FF2B5EF4-FFF2-40B4-BE49-F238E27FC236}">
-                <a16:creationId xmlns:a16="http://schemas.microsoft.com/office/drawing/2014/main" xmlns="" id="{CAFFEBAF-0266-7240-B46E-2EE1C5581EA1}"/>
+                <a16:creationId xmlns:a16="http://schemas.microsoft.com/office/drawing/2014/main" id="{CAFFEBAF-0266-7240-B46E-2EE1C5581EA1}"/>
               </a:ext>
             </a:extLst>
           </p:cNvPr>
@@ -1550,7 +1549,7 @@
           <p:cNvPr id="6" name="Slide Number Placeholder 5">
             <a:extLst>
               <a:ext uri="{FF2B5EF4-FFF2-40B4-BE49-F238E27FC236}">
-                <a16:creationId xmlns:a16="http://schemas.microsoft.com/office/drawing/2014/main" xmlns="" id="{FF3EF199-97E8-3840-83A1-7896494AE345}"/>
+                <a16:creationId xmlns:a16="http://schemas.microsoft.com/office/drawing/2014/main" id="{FF3EF199-97E8-3840-83A1-7896494AE345}"/>
               </a:ext>
             </a:extLst>
           </p:cNvPr>
@@ -1609,7 +1608,7 @@
           <p:cNvPr id="2" name="Title 1">
             <a:extLst>
               <a:ext uri="{FF2B5EF4-FFF2-40B4-BE49-F238E27FC236}">
-                <a16:creationId xmlns:a16="http://schemas.microsoft.com/office/drawing/2014/main" xmlns="" id="{DE6E07E4-2B00-9D4B-A242-44D457947122}"/>
+                <a16:creationId xmlns:a16="http://schemas.microsoft.com/office/drawing/2014/main" id="{DE6E07E4-2B00-9D4B-A242-44D457947122}"/>
               </a:ext>
             </a:extLst>
           </p:cNvPr>
@@ -1646,7 +1645,7 @@
           <p:cNvPr id="3" name="Text Placeholder 2">
             <a:extLst>
               <a:ext uri="{FF2B5EF4-FFF2-40B4-BE49-F238E27FC236}">
-                <a16:creationId xmlns:a16="http://schemas.microsoft.com/office/drawing/2014/main" xmlns="" id="{713B5427-53FE-F545-A24B-39D9FA985005}"/>
+                <a16:creationId xmlns:a16="http://schemas.microsoft.com/office/drawing/2014/main" id="{713B5427-53FE-F545-A24B-39D9FA985005}"/>
               </a:ext>
             </a:extLst>
           </p:cNvPr>
@@ -1771,7 +1770,7 @@
           <p:cNvPr id="4" name="Date Placeholder 3">
             <a:extLst>
               <a:ext uri="{FF2B5EF4-FFF2-40B4-BE49-F238E27FC236}">
-                <a16:creationId xmlns:a16="http://schemas.microsoft.com/office/drawing/2014/main" xmlns="" id="{A4E69022-8E44-094B-A2AC-871E588DD133}"/>
+                <a16:creationId xmlns:a16="http://schemas.microsoft.com/office/drawing/2014/main" id="{A4E69022-8E44-094B-A2AC-871E588DD133}"/>
               </a:ext>
             </a:extLst>
           </p:cNvPr>
@@ -1789,7 +1788,7 @@
           <a:p>
             <a:fld id="{535F16BF-3CF2-8C4D-A235-C33F2149ABED}" type="datetimeFigureOut">
               <a:rPr lang="en-US" smtClean="0"/>
-              <a:t>11/29/2018</a:t>
+              <a:t>12/12/2018</a:t>
             </a:fld>
             <a:endParaRPr lang="en-US"/>
           </a:p>
@@ -1800,7 +1799,7 @@
           <p:cNvPr id="5" name="Footer Placeholder 4">
             <a:extLst>
               <a:ext uri="{FF2B5EF4-FFF2-40B4-BE49-F238E27FC236}">
-                <a16:creationId xmlns:a16="http://schemas.microsoft.com/office/drawing/2014/main" xmlns="" id="{859FEF3D-3F19-D44D-846B-CBD11DFD84F6}"/>
+                <a16:creationId xmlns:a16="http://schemas.microsoft.com/office/drawing/2014/main" id="{859FEF3D-3F19-D44D-846B-CBD11DFD84F6}"/>
               </a:ext>
             </a:extLst>
           </p:cNvPr>
@@ -1825,7 +1824,7 @@
           <p:cNvPr id="6" name="Slide Number Placeholder 5">
             <a:extLst>
               <a:ext uri="{FF2B5EF4-FFF2-40B4-BE49-F238E27FC236}">
-                <a16:creationId xmlns:a16="http://schemas.microsoft.com/office/drawing/2014/main" xmlns="" id="{BDD1C6CE-9992-2242-BFCA-B59D589A2F3C}"/>
+                <a16:creationId xmlns:a16="http://schemas.microsoft.com/office/drawing/2014/main" id="{BDD1C6CE-9992-2242-BFCA-B59D589A2F3C}"/>
               </a:ext>
             </a:extLst>
           </p:cNvPr>
@@ -1884,7 +1883,7 @@
           <p:cNvPr id="2" name="Title 1">
             <a:extLst>
               <a:ext uri="{FF2B5EF4-FFF2-40B4-BE49-F238E27FC236}">
-                <a16:creationId xmlns:a16="http://schemas.microsoft.com/office/drawing/2014/main" xmlns="" id="{175BDA02-1299-3A4B-BF6F-8B7D50A87840}"/>
+                <a16:creationId xmlns:a16="http://schemas.microsoft.com/office/drawing/2014/main" id="{175BDA02-1299-3A4B-BF6F-8B7D50A87840}"/>
               </a:ext>
             </a:extLst>
           </p:cNvPr>
@@ -1912,7 +1911,7 @@
           <p:cNvPr id="3" name="Content Placeholder 2">
             <a:extLst>
               <a:ext uri="{FF2B5EF4-FFF2-40B4-BE49-F238E27FC236}">
-                <a16:creationId xmlns:a16="http://schemas.microsoft.com/office/drawing/2014/main" xmlns="" id="{8C3043A3-1354-9145-AE63-4901ED9E0691}"/>
+                <a16:creationId xmlns:a16="http://schemas.microsoft.com/office/drawing/2014/main" id="{8C3043A3-1354-9145-AE63-4901ED9E0691}"/>
               </a:ext>
             </a:extLst>
           </p:cNvPr>
@@ -1974,7 +1973,7 @@
           <p:cNvPr id="4" name="Content Placeholder 3">
             <a:extLst>
               <a:ext uri="{FF2B5EF4-FFF2-40B4-BE49-F238E27FC236}">
-                <a16:creationId xmlns:a16="http://schemas.microsoft.com/office/drawing/2014/main" xmlns="" id="{DDB6C90F-E69B-1744-A563-DA30551B9F7D}"/>
+                <a16:creationId xmlns:a16="http://schemas.microsoft.com/office/drawing/2014/main" id="{DDB6C90F-E69B-1744-A563-DA30551B9F7D}"/>
               </a:ext>
             </a:extLst>
           </p:cNvPr>
@@ -2036,7 +2035,7 @@
           <p:cNvPr id="5" name="Date Placeholder 4">
             <a:extLst>
               <a:ext uri="{FF2B5EF4-FFF2-40B4-BE49-F238E27FC236}">
-                <a16:creationId xmlns:a16="http://schemas.microsoft.com/office/drawing/2014/main" xmlns="" id="{F3B2C812-7EE8-7E4D-BC89-DF62DD52A27B}"/>
+                <a16:creationId xmlns:a16="http://schemas.microsoft.com/office/drawing/2014/main" id="{F3B2C812-7EE8-7E4D-BC89-DF62DD52A27B}"/>
               </a:ext>
             </a:extLst>
           </p:cNvPr>
@@ -2054,7 +2053,7 @@
           <a:p>
             <a:fld id="{535F16BF-3CF2-8C4D-A235-C33F2149ABED}" type="datetimeFigureOut">
               <a:rPr lang="en-US" smtClean="0"/>
-              <a:t>11/29/2018</a:t>
+              <a:t>12/12/2018</a:t>
             </a:fld>
             <a:endParaRPr lang="en-US"/>
           </a:p>
@@ -2065,7 +2064,7 @@
           <p:cNvPr id="6" name="Footer Placeholder 5">
             <a:extLst>
               <a:ext uri="{FF2B5EF4-FFF2-40B4-BE49-F238E27FC236}">
-                <a16:creationId xmlns:a16="http://schemas.microsoft.com/office/drawing/2014/main" xmlns="" id="{A75323E2-49CF-8E42-AF8A-079DFAD8DA09}"/>
+                <a16:creationId xmlns:a16="http://schemas.microsoft.com/office/drawing/2014/main" id="{A75323E2-49CF-8E42-AF8A-079DFAD8DA09}"/>
               </a:ext>
             </a:extLst>
           </p:cNvPr>
@@ -2090,7 +2089,7 @@
           <p:cNvPr id="7" name="Slide Number Placeholder 6">
             <a:extLst>
               <a:ext uri="{FF2B5EF4-FFF2-40B4-BE49-F238E27FC236}">
-                <a16:creationId xmlns:a16="http://schemas.microsoft.com/office/drawing/2014/main" xmlns="" id="{66A3C436-C55D-D84F-AFED-0617191D6C30}"/>
+                <a16:creationId xmlns:a16="http://schemas.microsoft.com/office/drawing/2014/main" id="{66A3C436-C55D-D84F-AFED-0617191D6C30}"/>
               </a:ext>
             </a:extLst>
           </p:cNvPr>
@@ -2149,7 +2148,7 @@
           <p:cNvPr id="2" name="Title 1">
             <a:extLst>
               <a:ext uri="{FF2B5EF4-FFF2-40B4-BE49-F238E27FC236}">
-                <a16:creationId xmlns:a16="http://schemas.microsoft.com/office/drawing/2014/main" xmlns="" id="{77586A55-D924-4544-B299-C75FF9B32264}"/>
+                <a16:creationId xmlns:a16="http://schemas.microsoft.com/office/drawing/2014/main" id="{77586A55-D924-4544-B299-C75FF9B32264}"/>
               </a:ext>
             </a:extLst>
           </p:cNvPr>
@@ -2182,7 +2181,7 @@
           <p:cNvPr id="3" name="Text Placeholder 2">
             <a:extLst>
               <a:ext uri="{FF2B5EF4-FFF2-40B4-BE49-F238E27FC236}">
-                <a16:creationId xmlns:a16="http://schemas.microsoft.com/office/drawing/2014/main" xmlns="" id="{E3C8FDD3-E613-6841-BCBD-40D293B7D8ED}"/>
+                <a16:creationId xmlns:a16="http://schemas.microsoft.com/office/drawing/2014/main" id="{E3C8FDD3-E613-6841-BCBD-40D293B7D8ED}"/>
               </a:ext>
             </a:extLst>
           </p:cNvPr>
@@ -2253,7 +2252,7 @@
           <p:cNvPr id="4" name="Content Placeholder 3">
             <a:extLst>
               <a:ext uri="{FF2B5EF4-FFF2-40B4-BE49-F238E27FC236}">
-                <a16:creationId xmlns:a16="http://schemas.microsoft.com/office/drawing/2014/main" xmlns="" id="{8677342E-B862-F641-8DB0-3A948D4912C2}"/>
+                <a16:creationId xmlns:a16="http://schemas.microsoft.com/office/drawing/2014/main" id="{8677342E-B862-F641-8DB0-3A948D4912C2}"/>
               </a:ext>
             </a:extLst>
           </p:cNvPr>
@@ -2315,7 +2314,7 @@
           <p:cNvPr id="5" name="Text Placeholder 4">
             <a:extLst>
               <a:ext uri="{FF2B5EF4-FFF2-40B4-BE49-F238E27FC236}">
-                <a16:creationId xmlns:a16="http://schemas.microsoft.com/office/drawing/2014/main" xmlns="" id="{B44BA19B-497E-594F-BBC0-12473FCCF065}"/>
+                <a16:creationId xmlns:a16="http://schemas.microsoft.com/office/drawing/2014/main" id="{B44BA19B-497E-594F-BBC0-12473FCCF065}"/>
               </a:ext>
             </a:extLst>
           </p:cNvPr>
@@ -2386,7 +2385,7 @@
           <p:cNvPr id="6" name="Content Placeholder 5">
             <a:extLst>
               <a:ext uri="{FF2B5EF4-FFF2-40B4-BE49-F238E27FC236}">
-                <a16:creationId xmlns:a16="http://schemas.microsoft.com/office/drawing/2014/main" xmlns="" id="{CB440465-359A-6E44-BB2D-24A3F7E08551}"/>
+                <a16:creationId xmlns:a16="http://schemas.microsoft.com/office/drawing/2014/main" id="{CB440465-359A-6E44-BB2D-24A3F7E08551}"/>
               </a:ext>
             </a:extLst>
           </p:cNvPr>
@@ -2448,7 +2447,7 @@
           <p:cNvPr id="7" name="Date Placeholder 6">
             <a:extLst>
               <a:ext uri="{FF2B5EF4-FFF2-40B4-BE49-F238E27FC236}">
-                <a16:creationId xmlns:a16="http://schemas.microsoft.com/office/drawing/2014/main" xmlns="" id="{49CE6B12-65FA-5946-9787-D8135A3F98F9}"/>
+                <a16:creationId xmlns:a16="http://schemas.microsoft.com/office/drawing/2014/main" id="{49CE6B12-65FA-5946-9787-D8135A3F98F9}"/>
               </a:ext>
             </a:extLst>
           </p:cNvPr>
@@ -2466,7 +2465,7 @@
           <a:p>
             <a:fld id="{535F16BF-3CF2-8C4D-A235-C33F2149ABED}" type="datetimeFigureOut">
               <a:rPr lang="en-US" smtClean="0"/>
-              <a:t>11/29/2018</a:t>
+              <a:t>12/12/2018</a:t>
             </a:fld>
             <a:endParaRPr lang="en-US"/>
           </a:p>
@@ -2477,7 +2476,7 @@
           <p:cNvPr id="8" name="Footer Placeholder 7">
             <a:extLst>
               <a:ext uri="{FF2B5EF4-FFF2-40B4-BE49-F238E27FC236}">
-                <a16:creationId xmlns:a16="http://schemas.microsoft.com/office/drawing/2014/main" xmlns="" id="{721DE244-B0CA-2F4D-B20E-7249E93D82D1}"/>
+                <a16:creationId xmlns:a16="http://schemas.microsoft.com/office/drawing/2014/main" id="{721DE244-B0CA-2F4D-B20E-7249E93D82D1}"/>
               </a:ext>
             </a:extLst>
           </p:cNvPr>
@@ -2502,7 +2501,7 @@
           <p:cNvPr id="9" name="Slide Number Placeholder 8">
             <a:extLst>
               <a:ext uri="{FF2B5EF4-FFF2-40B4-BE49-F238E27FC236}">
-                <a16:creationId xmlns:a16="http://schemas.microsoft.com/office/drawing/2014/main" xmlns="" id="{C12A1451-73BF-0544-B7DC-9FD019536116}"/>
+                <a16:creationId xmlns:a16="http://schemas.microsoft.com/office/drawing/2014/main" id="{C12A1451-73BF-0544-B7DC-9FD019536116}"/>
               </a:ext>
             </a:extLst>
           </p:cNvPr>
@@ -2561,7 +2560,7 @@
           <p:cNvPr id="2" name="Title 1">
             <a:extLst>
               <a:ext uri="{FF2B5EF4-FFF2-40B4-BE49-F238E27FC236}">
-                <a16:creationId xmlns:a16="http://schemas.microsoft.com/office/drawing/2014/main" xmlns="" id="{43420EB5-D3EF-D141-B38C-AE6AEF8EBB4B}"/>
+                <a16:creationId xmlns:a16="http://schemas.microsoft.com/office/drawing/2014/main" id="{43420EB5-D3EF-D141-B38C-AE6AEF8EBB4B}"/>
               </a:ext>
             </a:extLst>
           </p:cNvPr>
@@ -2589,7 +2588,7 @@
           <p:cNvPr id="3" name="Date Placeholder 2">
             <a:extLst>
               <a:ext uri="{FF2B5EF4-FFF2-40B4-BE49-F238E27FC236}">
-                <a16:creationId xmlns:a16="http://schemas.microsoft.com/office/drawing/2014/main" xmlns="" id="{77767C16-42DE-3E4B-B72C-9C32A54C24A6}"/>
+                <a16:creationId xmlns:a16="http://schemas.microsoft.com/office/drawing/2014/main" id="{77767C16-42DE-3E4B-B72C-9C32A54C24A6}"/>
               </a:ext>
             </a:extLst>
           </p:cNvPr>
@@ -2607,7 +2606,7 @@
           <a:p>
             <a:fld id="{535F16BF-3CF2-8C4D-A235-C33F2149ABED}" type="datetimeFigureOut">
               <a:rPr lang="en-US" smtClean="0"/>
-              <a:t>11/29/2018</a:t>
+              <a:t>12/12/2018</a:t>
             </a:fld>
             <a:endParaRPr lang="en-US"/>
           </a:p>
@@ -2618,7 +2617,7 @@
           <p:cNvPr id="4" name="Footer Placeholder 3">
             <a:extLst>
               <a:ext uri="{FF2B5EF4-FFF2-40B4-BE49-F238E27FC236}">
-                <a16:creationId xmlns:a16="http://schemas.microsoft.com/office/drawing/2014/main" xmlns="" id="{C21493F1-3554-6F44-A8B8-C416437958D6}"/>
+                <a16:creationId xmlns:a16="http://schemas.microsoft.com/office/drawing/2014/main" id="{C21493F1-3554-6F44-A8B8-C416437958D6}"/>
               </a:ext>
             </a:extLst>
           </p:cNvPr>
@@ -2643,7 +2642,7 @@
           <p:cNvPr id="5" name="Slide Number Placeholder 4">
             <a:extLst>
               <a:ext uri="{FF2B5EF4-FFF2-40B4-BE49-F238E27FC236}">
-                <a16:creationId xmlns:a16="http://schemas.microsoft.com/office/drawing/2014/main" xmlns="" id="{ECD6192B-63A7-A941-B1C7-520682F3E4AF}"/>
+                <a16:creationId xmlns:a16="http://schemas.microsoft.com/office/drawing/2014/main" id="{ECD6192B-63A7-A941-B1C7-520682F3E4AF}"/>
               </a:ext>
             </a:extLst>
           </p:cNvPr>
@@ -2702,7 +2701,7 @@
           <p:cNvPr id="2" name="Date Placeholder 1">
             <a:extLst>
               <a:ext uri="{FF2B5EF4-FFF2-40B4-BE49-F238E27FC236}">
-                <a16:creationId xmlns:a16="http://schemas.microsoft.com/office/drawing/2014/main" xmlns="" id="{8752B5A9-C39D-F043-B944-E1309C95B88E}"/>
+                <a16:creationId xmlns:a16="http://schemas.microsoft.com/office/drawing/2014/main" id="{8752B5A9-C39D-F043-B944-E1309C95B88E}"/>
               </a:ext>
             </a:extLst>
           </p:cNvPr>
@@ -2720,7 +2719,7 @@
           <a:p>
             <a:fld id="{535F16BF-3CF2-8C4D-A235-C33F2149ABED}" type="datetimeFigureOut">
               <a:rPr lang="en-US" smtClean="0"/>
-              <a:t>11/29/2018</a:t>
+              <a:t>12/12/2018</a:t>
             </a:fld>
             <a:endParaRPr lang="en-US"/>
           </a:p>
@@ -2731,7 +2730,7 @@
           <p:cNvPr id="3" name="Footer Placeholder 2">
             <a:extLst>
               <a:ext uri="{FF2B5EF4-FFF2-40B4-BE49-F238E27FC236}">
-                <a16:creationId xmlns:a16="http://schemas.microsoft.com/office/drawing/2014/main" xmlns="" id="{F06A5008-9AAC-E246-A986-A9CAB89D6BFC}"/>
+                <a16:creationId xmlns:a16="http://schemas.microsoft.com/office/drawing/2014/main" id="{F06A5008-9AAC-E246-A986-A9CAB89D6BFC}"/>
               </a:ext>
             </a:extLst>
           </p:cNvPr>
@@ -2756,7 +2755,7 @@
           <p:cNvPr id="4" name="Slide Number Placeholder 3">
             <a:extLst>
               <a:ext uri="{FF2B5EF4-FFF2-40B4-BE49-F238E27FC236}">
-                <a16:creationId xmlns:a16="http://schemas.microsoft.com/office/drawing/2014/main" xmlns="" id="{650B3C1A-FAAC-D243-9355-5C10D8587878}"/>
+                <a16:creationId xmlns:a16="http://schemas.microsoft.com/office/drawing/2014/main" id="{650B3C1A-FAAC-D243-9355-5C10D8587878}"/>
               </a:ext>
             </a:extLst>
           </p:cNvPr>
@@ -2815,7 +2814,7 @@
           <p:cNvPr id="2" name="Title 1">
             <a:extLst>
               <a:ext uri="{FF2B5EF4-FFF2-40B4-BE49-F238E27FC236}">
-                <a16:creationId xmlns:a16="http://schemas.microsoft.com/office/drawing/2014/main" xmlns="" id="{BECD610C-BB60-B34F-9178-6D4E8CDC6E05}"/>
+                <a16:creationId xmlns:a16="http://schemas.microsoft.com/office/drawing/2014/main" id="{BECD610C-BB60-B34F-9178-6D4E8CDC6E05}"/>
               </a:ext>
             </a:extLst>
           </p:cNvPr>
@@ -2852,7 +2851,7 @@
           <p:cNvPr id="3" name="Content Placeholder 2">
             <a:extLst>
               <a:ext uri="{FF2B5EF4-FFF2-40B4-BE49-F238E27FC236}">
-                <a16:creationId xmlns:a16="http://schemas.microsoft.com/office/drawing/2014/main" xmlns="" id="{DE67E225-B845-6B42-8B77-DEF4C1F9925A}"/>
+                <a16:creationId xmlns:a16="http://schemas.microsoft.com/office/drawing/2014/main" id="{DE67E225-B845-6B42-8B77-DEF4C1F9925A}"/>
               </a:ext>
             </a:extLst>
           </p:cNvPr>
@@ -2942,7 +2941,7 @@
           <p:cNvPr id="4" name="Text Placeholder 3">
             <a:extLst>
               <a:ext uri="{FF2B5EF4-FFF2-40B4-BE49-F238E27FC236}">
-                <a16:creationId xmlns:a16="http://schemas.microsoft.com/office/drawing/2014/main" xmlns="" id="{E01642EE-85DE-F043-842B-4C854C102137}"/>
+                <a16:creationId xmlns:a16="http://schemas.microsoft.com/office/drawing/2014/main" id="{E01642EE-85DE-F043-842B-4C854C102137}"/>
               </a:ext>
             </a:extLst>
           </p:cNvPr>
@@ -3013,7 +3012,7 @@
           <p:cNvPr id="5" name="Date Placeholder 4">
             <a:extLst>
               <a:ext uri="{FF2B5EF4-FFF2-40B4-BE49-F238E27FC236}">
-                <a16:creationId xmlns:a16="http://schemas.microsoft.com/office/drawing/2014/main" xmlns="" id="{C14A561A-6759-0340-B1F2-8A6F32126408}"/>
+                <a16:creationId xmlns:a16="http://schemas.microsoft.com/office/drawing/2014/main" id="{C14A561A-6759-0340-B1F2-8A6F32126408}"/>
               </a:ext>
             </a:extLst>
           </p:cNvPr>
@@ -3031,7 +3030,7 @@
           <a:p>
             <a:fld id="{535F16BF-3CF2-8C4D-A235-C33F2149ABED}" type="datetimeFigureOut">
               <a:rPr lang="en-US" smtClean="0"/>
-              <a:t>11/29/2018</a:t>
+              <a:t>12/12/2018</a:t>
             </a:fld>
             <a:endParaRPr lang="en-US"/>
           </a:p>
@@ -3042,7 +3041,7 @@
           <p:cNvPr id="6" name="Footer Placeholder 5">
             <a:extLst>
               <a:ext uri="{FF2B5EF4-FFF2-40B4-BE49-F238E27FC236}">
-                <a16:creationId xmlns:a16="http://schemas.microsoft.com/office/drawing/2014/main" xmlns="" id="{E7F277A3-6E5B-3349-8C95-DDFBEF873402}"/>
+                <a16:creationId xmlns:a16="http://schemas.microsoft.com/office/drawing/2014/main" id="{E7F277A3-6E5B-3349-8C95-DDFBEF873402}"/>
               </a:ext>
             </a:extLst>
           </p:cNvPr>
@@ -3067,7 +3066,7 @@
           <p:cNvPr id="7" name="Slide Number Placeholder 6">
             <a:extLst>
               <a:ext uri="{FF2B5EF4-FFF2-40B4-BE49-F238E27FC236}">
-                <a16:creationId xmlns:a16="http://schemas.microsoft.com/office/drawing/2014/main" xmlns="" id="{3EC49234-E292-D34E-80C3-CD13E01964DE}"/>
+                <a16:creationId xmlns:a16="http://schemas.microsoft.com/office/drawing/2014/main" id="{3EC49234-E292-D34E-80C3-CD13E01964DE}"/>
               </a:ext>
             </a:extLst>
           </p:cNvPr>
@@ -3126,7 +3125,7 @@
           <p:cNvPr id="2" name="Title 1">
             <a:extLst>
               <a:ext uri="{FF2B5EF4-FFF2-40B4-BE49-F238E27FC236}">
-                <a16:creationId xmlns:a16="http://schemas.microsoft.com/office/drawing/2014/main" xmlns="" id="{919A8151-05A7-B849-90A5-68EB026CC3D6}"/>
+                <a16:creationId xmlns:a16="http://schemas.microsoft.com/office/drawing/2014/main" id="{919A8151-05A7-B849-90A5-68EB026CC3D6}"/>
               </a:ext>
             </a:extLst>
           </p:cNvPr>
@@ -3163,7 +3162,7 @@
           <p:cNvPr id="3" name="Picture Placeholder 2">
             <a:extLst>
               <a:ext uri="{FF2B5EF4-FFF2-40B4-BE49-F238E27FC236}">
-                <a16:creationId xmlns:a16="http://schemas.microsoft.com/office/drawing/2014/main" xmlns="" id="{98FC1686-6DCC-2E40-939D-408473398C03}"/>
+                <a16:creationId xmlns:a16="http://schemas.microsoft.com/office/drawing/2014/main" id="{98FC1686-6DCC-2E40-939D-408473398C03}"/>
               </a:ext>
             </a:extLst>
           </p:cNvPr>
@@ -3230,7 +3229,7 @@
           <p:cNvPr id="4" name="Text Placeholder 3">
             <a:extLst>
               <a:ext uri="{FF2B5EF4-FFF2-40B4-BE49-F238E27FC236}">
-                <a16:creationId xmlns:a16="http://schemas.microsoft.com/office/drawing/2014/main" xmlns="" id="{295B40AD-FDD9-2345-8CCE-277369069A81}"/>
+                <a16:creationId xmlns:a16="http://schemas.microsoft.com/office/drawing/2014/main" id="{295B40AD-FDD9-2345-8CCE-277369069A81}"/>
               </a:ext>
             </a:extLst>
           </p:cNvPr>
@@ -3301,7 +3300,7 @@
           <p:cNvPr id="5" name="Date Placeholder 4">
             <a:extLst>
               <a:ext uri="{FF2B5EF4-FFF2-40B4-BE49-F238E27FC236}">
-                <a16:creationId xmlns:a16="http://schemas.microsoft.com/office/drawing/2014/main" xmlns="" id="{B816B217-1721-EA41-9220-1C0895171169}"/>
+                <a16:creationId xmlns:a16="http://schemas.microsoft.com/office/drawing/2014/main" id="{B816B217-1721-EA41-9220-1C0895171169}"/>
               </a:ext>
             </a:extLst>
           </p:cNvPr>
@@ -3319,7 +3318,7 @@
           <a:p>
             <a:fld id="{535F16BF-3CF2-8C4D-A235-C33F2149ABED}" type="datetimeFigureOut">
               <a:rPr lang="en-US" smtClean="0"/>
-              <a:t>11/29/2018</a:t>
+              <a:t>12/12/2018</a:t>
             </a:fld>
             <a:endParaRPr lang="en-US"/>
           </a:p>
@@ -3330,7 +3329,7 @@
           <p:cNvPr id="6" name="Footer Placeholder 5">
             <a:extLst>
               <a:ext uri="{FF2B5EF4-FFF2-40B4-BE49-F238E27FC236}">
-                <a16:creationId xmlns:a16="http://schemas.microsoft.com/office/drawing/2014/main" xmlns="" id="{5199119A-0B19-734B-B3E9-3D5660134CC9}"/>
+                <a16:creationId xmlns:a16="http://schemas.microsoft.com/office/drawing/2014/main" id="{5199119A-0B19-734B-B3E9-3D5660134CC9}"/>
               </a:ext>
             </a:extLst>
           </p:cNvPr>
@@ -3355,7 +3354,7 @@
           <p:cNvPr id="7" name="Slide Number Placeholder 6">
             <a:extLst>
               <a:ext uri="{FF2B5EF4-FFF2-40B4-BE49-F238E27FC236}">
-                <a16:creationId xmlns:a16="http://schemas.microsoft.com/office/drawing/2014/main" xmlns="" id="{DA0AD206-607A-2A45-8BF9-E618A84A2671}"/>
+                <a16:creationId xmlns:a16="http://schemas.microsoft.com/office/drawing/2014/main" id="{DA0AD206-607A-2A45-8BF9-E618A84A2671}"/>
               </a:ext>
             </a:extLst>
           </p:cNvPr>
@@ -3419,7 +3418,7 @@
           <p:cNvPr id="2" name="Title Placeholder 1">
             <a:extLst>
               <a:ext uri="{FF2B5EF4-FFF2-40B4-BE49-F238E27FC236}">
-                <a16:creationId xmlns:a16="http://schemas.microsoft.com/office/drawing/2014/main" xmlns="" id="{C5FD3A52-2A72-3946-BCDB-4C24FFB0D0CD}"/>
+                <a16:creationId xmlns:a16="http://schemas.microsoft.com/office/drawing/2014/main" id="{C5FD3A52-2A72-3946-BCDB-4C24FFB0D0CD}"/>
               </a:ext>
             </a:extLst>
           </p:cNvPr>
@@ -3457,7 +3456,7 @@
           <p:cNvPr id="3" name="Text Placeholder 2">
             <a:extLst>
               <a:ext uri="{FF2B5EF4-FFF2-40B4-BE49-F238E27FC236}">
-                <a16:creationId xmlns:a16="http://schemas.microsoft.com/office/drawing/2014/main" xmlns="" id="{6E95E879-6643-8E45-A9CF-28D4594D5EFF}"/>
+                <a16:creationId xmlns:a16="http://schemas.microsoft.com/office/drawing/2014/main" id="{6E95E879-6643-8E45-A9CF-28D4594D5EFF}"/>
               </a:ext>
             </a:extLst>
           </p:cNvPr>
@@ -3524,7 +3523,7 @@
           <p:cNvPr id="4" name="Date Placeholder 3">
             <a:extLst>
               <a:ext uri="{FF2B5EF4-FFF2-40B4-BE49-F238E27FC236}">
-                <a16:creationId xmlns:a16="http://schemas.microsoft.com/office/drawing/2014/main" xmlns="" id="{A669012D-858A-3149-8C6F-DB166DC4AFB7}"/>
+                <a16:creationId xmlns:a16="http://schemas.microsoft.com/office/drawing/2014/main" id="{A669012D-858A-3149-8C6F-DB166DC4AFB7}"/>
               </a:ext>
             </a:extLst>
           </p:cNvPr>
@@ -3560,7 +3559,7 @@
           <a:p>
             <a:fld id="{535F16BF-3CF2-8C4D-A235-C33F2149ABED}" type="datetimeFigureOut">
               <a:rPr lang="en-US" smtClean="0"/>
-              <a:t>11/29/2018</a:t>
+              <a:t>12/12/2018</a:t>
             </a:fld>
             <a:endParaRPr lang="en-US"/>
           </a:p>
@@ -3571,7 +3570,7 @@
           <p:cNvPr id="5" name="Footer Placeholder 4">
             <a:extLst>
               <a:ext uri="{FF2B5EF4-FFF2-40B4-BE49-F238E27FC236}">
-                <a16:creationId xmlns:a16="http://schemas.microsoft.com/office/drawing/2014/main" xmlns="" id="{2E9F1552-E8FF-0C44-9642-294F9E8CB021}"/>
+                <a16:creationId xmlns:a16="http://schemas.microsoft.com/office/drawing/2014/main" id="{2E9F1552-E8FF-0C44-9642-294F9E8CB021}"/>
               </a:ext>
             </a:extLst>
           </p:cNvPr>
@@ -3614,7 +3613,7 @@
           <p:cNvPr id="6" name="Slide Number Placeholder 5">
             <a:extLst>
               <a:ext uri="{FF2B5EF4-FFF2-40B4-BE49-F238E27FC236}">
-                <a16:creationId xmlns:a16="http://schemas.microsoft.com/office/drawing/2014/main" xmlns="" id="{7915618B-E3F6-BD4A-8E04-61E94E37A01F}"/>
+                <a16:creationId xmlns:a16="http://schemas.microsoft.com/office/drawing/2014/main" id="{7915618B-E3F6-BD4A-8E04-61E94E37A01F}"/>
               </a:ext>
             </a:extLst>
           </p:cNvPr>
@@ -3982,7 +3981,7 @@
           <p:cNvPr id="4" name="Title 1">
             <a:extLst>
               <a:ext uri="{FF2B5EF4-FFF2-40B4-BE49-F238E27FC236}">
-                <a16:creationId xmlns:a16="http://schemas.microsoft.com/office/drawing/2014/main" xmlns="" id="{A5A27F75-0274-5041-893F-103A09E6E077}"/>
+                <a16:creationId xmlns:a16="http://schemas.microsoft.com/office/drawing/2014/main" id="{A5A27F75-0274-5041-893F-103A09E6E077}"/>
               </a:ext>
             </a:extLst>
           </p:cNvPr>
@@ -4007,17 +4006,16 @@
           <a:p>
             <a:r>
               <a:rPr lang="en-US" sz="7200" dirty="0"/>
-              <a:t>Machine Learning with </a:t>
-            </a:r>
-            <a:r>
-              <a:rPr lang="en-US" sz="7200" dirty="0" err="1" smtClean="0"/>
+              <a:t>Machine Learning and Model Evaluation with </a:t>
+            </a:r>
+            <a:r>
+              <a:rPr lang="en-US" sz="7200" dirty="0" err="1"/>
               <a:t>scikit</a:t>
             </a:r>
             <a:r>
-              <a:rPr lang="en-US" sz="7200" dirty="0" smtClean="0"/>
+              <a:rPr lang="en-US" sz="7200" dirty="0"/>
               <a:t>-learn</a:t>
             </a:r>
-            <a:endParaRPr lang="en-US" sz="7200" dirty="0"/>
           </a:p>
         </p:txBody>
       </p:sp>
@@ -4026,7 +4024,7 @@
           <p:cNvPr id="5" name="Subtitle 2">
             <a:extLst>
               <a:ext uri="{FF2B5EF4-FFF2-40B4-BE49-F238E27FC236}">
-                <a16:creationId xmlns:a16="http://schemas.microsoft.com/office/drawing/2014/main" xmlns="" id="{B7BC0846-0B83-4148-A848-DA284A007A86}"/>
+                <a16:creationId xmlns:a16="http://schemas.microsoft.com/office/drawing/2014/main" id="{B7BC0846-0B83-4148-A848-DA284A007A86}"/>
               </a:ext>
             </a:extLst>
           </p:cNvPr>
@@ -4061,7 +4059,7 @@
           <p:cNvPr id="12" name="Picture 11">
             <a:extLst>
               <a:ext uri="{FF2B5EF4-FFF2-40B4-BE49-F238E27FC236}">
-                <a16:creationId xmlns:a16="http://schemas.microsoft.com/office/drawing/2014/main" xmlns="" id="{87089A12-638E-9E4A-9956-847B8D22D7E5}"/>
+                <a16:creationId xmlns:a16="http://schemas.microsoft.com/office/drawing/2014/main" id="{87089A12-638E-9E4A-9956-847B8D22D7E5}"/>
               </a:ext>
             </a:extLst>
           </p:cNvPr>
@@ -4091,7 +4089,7 @@
           <p:cNvPr id="13" name="Subtitle 2">
             <a:extLst>
               <a:ext uri="{FF2B5EF4-FFF2-40B4-BE49-F238E27FC236}">
-                <a16:creationId xmlns:a16="http://schemas.microsoft.com/office/drawing/2014/main" xmlns="" id="{32B2442F-8482-134E-B7BB-ACDEE32DFF66}"/>
+                <a16:creationId xmlns:a16="http://schemas.microsoft.com/office/drawing/2014/main" id="{32B2442F-8482-134E-B7BB-ACDEE32DFF66}"/>
               </a:ext>
             </a:extLst>
           </p:cNvPr>
@@ -4279,10 +4277,9 @@
           </a:lstStyle>
           <a:p>
             <a:r>
-              <a:rPr lang="en-US" sz="3800" dirty="0" smtClean="0"/>
+              <a:rPr lang="en-US" sz="3800" dirty="0"/>
               <a:t>A</a:t>
             </a:r>
-            <a:endParaRPr lang="en-US" sz="3800" dirty="0"/>
           </a:p>
         </p:txBody>
       </p:sp>
@@ -4291,7 +4288,7 @@
           <p:cNvPr id="8" name="Title 1">
             <a:extLst>
               <a:ext uri="{FF2B5EF4-FFF2-40B4-BE49-F238E27FC236}">
-                <a16:creationId xmlns:a16="http://schemas.microsoft.com/office/drawing/2014/main" xmlns="" id="{8A6EF488-D0AA-074A-A33E-2C739931D53E}"/>
+                <a16:creationId xmlns:a16="http://schemas.microsoft.com/office/drawing/2014/main" id="{8A6EF488-D0AA-074A-A33E-2C739931D53E}"/>
               </a:ext>
             </a:extLst>
           </p:cNvPr>
@@ -4335,14 +4332,10 @@
           <a:p>
             <a:r>
               <a:rPr lang="en-US" sz="4800" dirty="0"/>
-              <a:t>Intro to Data Science </a:t>
-            </a:r>
-            <a:r>
-              <a:rPr lang="en-US" sz="4800" dirty="0" smtClean="0"/>
-              <a:t>using </a:t>
-            </a:r>
-            <a:r>
-              <a:rPr lang="en-US" sz="4800" dirty="0" err="1" smtClean="0"/>
+              <a:t>Intro to Data Science using </a:t>
+            </a:r>
+            <a:r>
+              <a:rPr lang="en-US" sz="4800" dirty="0" err="1"/>
               <a:t>Jupyter</a:t>
             </a:r>
             <a:endParaRPr lang="en-US" sz="4800" dirty="0"/>
@@ -4350,13 +4343,8 @@
           <a:p>
             <a:r>
               <a:rPr lang="en-US" sz="4800" dirty="0"/>
-              <a:t> PART </a:t>
-            </a:r>
-            <a:r>
-              <a:rPr lang="en-US" sz="4800" dirty="0" smtClean="0"/>
-              <a:t>2:</a:t>
-            </a:r>
-            <a:endParaRPr lang="en-US" sz="4800" dirty="0"/>
+              <a:t> PART 2:</a:t>
+            </a:r>
           </a:p>
         </p:txBody>
       </p:sp>
@@ -4406,13 +4394,6 @@
       </p:transition>
     </mc:Fallback>
   </mc:AlternateContent>
-  <p:timing>
-    <p:tnLst>
-      <p:par>
-        <p:cTn id="1" dur="indefinite" restart="never" nodeType="tmRoot"/>
-      </p:par>
-    </p:tnLst>
-  </p:timing>
 </p:sld>
 </file>
 
@@ -4449,14 +4430,9 @@
           <a:lstStyle/>
           <a:p>
             <a:r>
-              <a:rPr lang="en-US" dirty="0" smtClean="0"/>
-              <a:t>Model Evaluation Tutorial Based </a:t>
-            </a:r>
-            <a:r>
-              <a:rPr lang="en-US" dirty="0" smtClean="0"/>
-              <a:t>on</a:t>
-            </a:r>
-            <a:endParaRPr lang="en-US" dirty="0"/>
+              <a:rPr lang="en-US" dirty="0"/>
+              <a:t>Model Evaluation Tutorial Based on</a:t>
+            </a:r>
           </a:p>
         </p:txBody>
       </p:sp>
@@ -4481,7 +4457,7 @@
           <a:lstStyle/>
           <a:p>
             <a:r>
-              <a:rPr lang="en-US" dirty="0" smtClean="0"/>
+              <a:rPr lang="en-US" dirty="0"/>
               <a:t>Free online</a:t>
             </a:r>
           </a:p>
@@ -4490,15 +4466,9 @@
               <a:rPr lang="en-US" dirty="0">
                 <a:hlinkClick r:id="rId2"/>
               </a:rPr>
-              <a:t>https://jakevdp.github.io/PythonDataScienceHandbook</a:t>
-            </a:r>
-            <a:r>
-              <a:rPr lang="en-US" dirty="0" smtClean="0">
-                <a:hlinkClick r:id="rId2"/>
-              </a:rPr>
-              <a:t>/</a:t>
-            </a:r>
-            <a:endParaRPr lang="en-US" dirty="0" smtClean="0"/>
+              <a:t>https://jakevdp.github.io/PythonDataScienceHandbook/</a:t>
+            </a:r>
+            <a:endParaRPr lang="en-US" dirty="0"/>
           </a:p>
           <a:p>
             <a:endParaRPr lang="en-US" dirty="0"/>
@@ -4559,13 +4529,6 @@
   <p:clrMapOvr>
     <a:masterClrMapping/>
   </p:clrMapOvr>
-  <p:timing>
-    <p:tnLst>
-      <p:par>
-        <p:cTn id="1" dur="indefinite" restart="never" nodeType="tmRoot"/>
-      </p:par>
-    </p:tnLst>
-  </p:timing>
 </p:sld>
 </file>
 
@@ -4591,7 +4554,7 @@
           <p:cNvPr id="2" name="Title 1">
             <a:extLst>
               <a:ext uri="{FF2B5EF4-FFF2-40B4-BE49-F238E27FC236}">
-                <a16:creationId xmlns="" xmlns:a16="http://schemas.microsoft.com/office/drawing/2014/main" id="{BBF14F1D-960D-C040-9E18-B3B5900C7C24}"/>
+                <a16:creationId xmlns:a16="http://schemas.microsoft.com/office/drawing/2014/main" id="{BBF14F1D-960D-C040-9E18-B3B5900C7C24}"/>
               </a:ext>
             </a:extLst>
           </p:cNvPr>
@@ -4625,7 +4588,7 @@
           <p:cNvPr id="3" name="Content Placeholder 2">
             <a:extLst>
               <a:ext uri="{FF2B5EF4-FFF2-40B4-BE49-F238E27FC236}">
-                <a16:creationId xmlns="" xmlns:a16="http://schemas.microsoft.com/office/drawing/2014/main" id="{8BB8ACAD-3586-E348-A3FE-3D726EA3A05B}"/>
+                <a16:creationId xmlns:a16="http://schemas.microsoft.com/office/drawing/2014/main" id="{8BB8ACAD-3586-E348-A3FE-3D726EA3A05B}"/>
               </a:ext>
             </a:extLst>
           </p:cNvPr>
@@ -4681,7 +4644,7 @@
           <p:cNvPr id="4" name="Footer Placeholder 3">
             <a:extLst>
               <a:ext uri="{FF2B5EF4-FFF2-40B4-BE49-F238E27FC236}">
-                <a16:creationId xmlns="" xmlns:a16="http://schemas.microsoft.com/office/drawing/2014/main" id="{2AD5C954-9DC2-8741-AB4E-7B4A332CC682}"/>
+                <a16:creationId xmlns:a16="http://schemas.microsoft.com/office/drawing/2014/main" id="{2AD5C954-9DC2-8741-AB4E-7B4A332CC682}"/>
               </a:ext>
             </a:extLst>
           </p:cNvPr>
@@ -4711,13 +4674,6 @@
   <p:clrMapOvr>
     <a:masterClrMapping/>
   </p:clrMapOvr>
-  <p:timing>
-    <p:tnLst>
-      <p:par>
-        <p:cTn id="1" dur="indefinite" restart="never" nodeType="tmRoot"/>
-      </p:par>
-    </p:tnLst>
-  </p:timing>
 </p:sld>
 </file>
 
@@ -4743,7 +4699,7 @@
           <p:cNvPr id="2" name="Title 1">
             <a:extLst>
               <a:ext uri="{FF2B5EF4-FFF2-40B4-BE49-F238E27FC236}">
-                <a16:creationId xmlns="" xmlns:a16="http://schemas.microsoft.com/office/drawing/2014/main" id="{D5052C85-71A4-A444-8D8A-7FA5A35F9D84}"/>
+                <a16:creationId xmlns:a16="http://schemas.microsoft.com/office/drawing/2014/main" id="{D5052C85-71A4-A444-8D8A-7FA5A35F9D84}"/>
               </a:ext>
             </a:extLst>
           </p:cNvPr>
@@ -4777,7 +4733,7 @@
           <p:cNvPr id="3" name="Content Placeholder 2">
             <a:extLst>
               <a:ext uri="{FF2B5EF4-FFF2-40B4-BE49-F238E27FC236}">
-                <a16:creationId xmlns="" xmlns:a16="http://schemas.microsoft.com/office/drawing/2014/main" id="{08A331CC-D755-C645-A178-0B21FB5C834C}"/>
+                <a16:creationId xmlns:a16="http://schemas.microsoft.com/office/drawing/2014/main" id="{08A331CC-D755-C645-A178-0B21FB5C834C}"/>
               </a:ext>
             </a:extLst>
           </p:cNvPr>
@@ -4925,7 +4881,7 @@
           <p:cNvPr id="4" name="Footer Placeholder 3">
             <a:extLst>
               <a:ext uri="{FF2B5EF4-FFF2-40B4-BE49-F238E27FC236}">
-                <a16:creationId xmlns="" xmlns:a16="http://schemas.microsoft.com/office/drawing/2014/main" id="{7DC8C8B2-3BBF-BB44-8DF4-3698AE31E085}"/>
+                <a16:creationId xmlns:a16="http://schemas.microsoft.com/office/drawing/2014/main" id="{7DC8C8B2-3BBF-BB44-8DF4-3698AE31E085}"/>
               </a:ext>
             </a:extLst>
           </p:cNvPr>
@@ -4955,13 +4911,6 @@
   <p:clrMapOvr>
     <a:masterClrMapping/>
   </p:clrMapOvr>
-  <p:timing>
-    <p:tnLst>
-      <p:par>
-        <p:cTn id="1" dur="indefinite" restart="never" nodeType="tmRoot"/>
-      </p:par>
-    </p:tnLst>
-  </p:timing>
 </p:sld>
 </file>
 
@@ -4987,7 +4936,7 @@
           <p:cNvPr id="2" name="Title 1">
             <a:extLst>
               <a:ext uri="{FF2B5EF4-FFF2-40B4-BE49-F238E27FC236}">
-                <a16:creationId xmlns="" xmlns:a16="http://schemas.microsoft.com/office/drawing/2014/main" id="{43DE9610-B6C1-3947-9CC9-1921415101E1}"/>
+                <a16:creationId xmlns:a16="http://schemas.microsoft.com/office/drawing/2014/main" id="{43DE9610-B6C1-3947-9CC9-1921415101E1}"/>
               </a:ext>
             </a:extLst>
           </p:cNvPr>
@@ -5026,7 +4975,7 @@
           <p:cNvPr id="3" name="Content Placeholder 2">
             <a:extLst>
               <a:ext uri="{FF2B5EF4-FFF2-40B4-BE49-F238E27FC236}">
-                <a16:creationId xmlns="" xmlns:a16="http://schemas.microsoft.com/office/drawing/2014/main" id="{068CA2A5-A0C5-9D40-ABC8-164952D573F0}"/>
+                <a16:creationId xmlns:a16="http://schemas.microsoft.com/office/drawing/2014/main" id="{068CA2A5-A0C5-9D40-ABC8-164952D573F0}"/>
               </a:ext>
             </a:extLst>
           </p:cNvPr>
@@ -5086,7 +5035,7 @@
           <p:cNvPr id="4" name="Footer Placeholder 3">
             <a:extLst>
               <a:ext uri="{FF2B5EF4-FFF2-40B4-BE49-F238E27FC236}">
-                <a16:creationId xmlns="" xmlns:a16="http://schemas.microsoft.com/office/drawing/2014/main" id="{62FE62C7-8A8F-F04F-BD6D-A9F26C414CF6}"/>
+                <a16:creationId xmlns:a16="http://schemas.microsoft.com/office/drawing/2014/main" id="{62FE62C7-8A8F-F04F-BD6D-A9F26C414CF6}"/>
               </a:ext>
             </a:extLst>
           </p:cNvPr>
@@ -5111,7 +5060,7 @@
           <p:cNvPr id="5" name="Picture 4">
             <a:extLst>
               <a:ext uri="{FF2B5EF4-FFF2-40B4-BE49-F238E27FC236}">
-                <a16:creationId xmlns="" xmlns:a16="http://schemas.microsoft.com/office/drawing/2014/main" id="{A500AEFB-86CF-AB44-AEFC-A028E11C1E11}"/>
+                <a16:creationId xmlns:a16="http://schemas.microsoft.com/office/drawing/2014/main" id="{A500AEFB-86CF-AB44-AEFC-A028E11C1E11}"/>
               </a:ext>
             </a:extLst>
           </p:cNvPr>
@@ -5141,7 +5090,7 @@
           <p:cNvPr id="6" name="Picture 5">
             <a:extLst>
               <a:ext uri="{FF2B5EF4-FFF2-40B4-BE49-F238E27FC236}">
-                <a16:creationId xmlns="" xmlns:a16="http://schemas.microsoft.com/office/drawing/2014/main" id="{664BBD12-7848-7A41-8835-C70C3B230157}"/>
+                <a16:creationId xmlns:a16="http://schemas.microsoft.com/office/drawing/2014/main" id="{664BBD12-7848-7A41-8835-C70C3B230157}"/>
               </a:ext>
             </a:extLst>
           </p:cNvPr>
@@ -5171,7 +5120,7 @@
           <p:cNvPr id="8" name="Straight Arrow Connector 7">
             <a:extLst>
               <a:ext uri="{FF2B5EF4-FFF2-40B4-BE49-F238E27FC236}">
-                <a16:creationId xmlns="" xmlns:a16="http://schemas.microsoft.com/office/drawing/2014/main" id="{754C5DFD-7773-574E-BEA6-174438A8514F}"/>
+                <a16:creationId xmlns:a16="http://schemas.microsoft.com/office/drawing/2014/main" id="{754C5DFD-7773-574E-BEA6-174438A8514F}"/>
               </a:ext>
             </a:extLst>
           </p:cNvPr>
@@ -5215,13 +5164,6 @@
   <p:clrMapOvr>
     <a:masterClrMapping/>
   </p:clrMapOvr>
-  <p:timing>
-    <p:tnLst>
-      <p:par>
-        <p:cTn id="1" dur="indefinite" restart="never" nodeType="tmRoot"/>
-      </p:par>
-    </p:tnLst>
-  </p:timing>
 </p:sld>
 </file>
 
@@ -5258,10 +5200,9 @@
           <a:lstStyle/>
           <a:p>
             <a:r>
-              <a:rPr lang="en-US" dirty="0" smtClean="0"/>
+              <a:rPr lang="en-US" dirty="0"/>
               <a:t>Confusion Matrix</a:t>
             </a:r>
-            <a:endParaRPr lang="en-US" dirty="0"/>
           </a:p>
         </p:txBody>
       </p:sp>
@@ -5287,20 +5228,14 @@
           <a:lstStyle/>
           <a:p>
             <a:r>
-              <a:rPr lang="en-US" dirty="0" smtClean="0"/>
+              <a:rPr lang="en-US" dirty="0"/>
               <a:t>Source </a:t>
-            </a:r>
-            <a:r>
-              <a:rPr lang="en-US" dirty="0" smtClean="0">
-                <a:hlinkClick r:id="rId2"/>
-              </a:rPr>
-              <a:t>https</a:t>
             </a:r>
             <a:r>
               <a:rPr lang="en-US" dirty="0">
                 <a:hlinkClick r:id="rId2"/>
               </a:rPr>
-              <a:t>://en.wikipedia.org/wiki/Confusion_matrix</a:t>
+              <a:t>https://en.wikipedia.org/wiki/Confusion_matrix</a:t>
             </a:r>
             <a:endParaRPr lang="en-US" dirty="0"/>
           </a:p>
@@ -5340,13 +5275,6 @@
   <p:clrMapOvr>
     <a:masterClrMapping/>
   </p:clrMapOvr>
-  <p:timing>
-    <p:tnLst>
-      <p:par>
-        <p:cTn id="1" dur="indefinite" restart="never" nodeType="tmRoot"/>
-      </p:par>
-    </p:tnLst>
-  </p:timing>
 </p:sld>
 </file>
 
@@ -5383,10 +5311,9 @@
           <a:lstStyle/>
           <a:p>
             <a:r>
-              <a:rPr lang="en-US" dirty="0" smtClean="0"/>
+              <a:rPr lang="en-US" dirty="0"/>
               <a:t>Many Ways to Measure Success</a:t>
             </a:r>
-            <a:endParaRPr lang="en-US" dirty="0"/>
           </a:p>
         </p:txBody>
       </p:sp>
@@ -5409,15 +5336,9 @@
               <a:rPr lang="en-US" dirty="0">
                 <a:hlinkClick r:id="rId2"/>
               </a:rPr>
-              <a:t>https://</a:t>
-            </a:r>
-            <a:r>
-              <a:rPr lang="en-US" dirty="0" smtClean="0">
-                <a:hlinkClick r:id="rId2"/>
-              </a:rPr>
-              <a:t>en.wikipedia.org/wiki/Receiver_operating_characteristic</a:t>
-            </a:r>
-            <a:endParaRPr lang="en-US" dirty="0" smtClean="0"/>
+              <a:t>https://en.wikipedia.org/wiki/Receiver_operating_characteristic</a:t>
+            </a:r>
+            <a:endParaRPr lang="en-US" dirty="0"/>
           </a:p>
           <a:p>
             <a:endParaRPr lang="en-US" dirty="0"/>
@@ -5470,7 +5391,7 @@
         </p:blipFill>
         <p:spPr>
           <a:xfrm>
-            <a:off x="1507524" y="4610230"/>
+            <a:off x="339124" y="4610230"/>
             <a:ext cx="707483" cy="691404"/>
           </a:xfrm>
           <a:prstGeom prst="rect">
@@ -5483,7 +5404,7 @@
           <p:cNvPr id="3" name="Content Placeholder 2">
             <a:extLst>
               <a:ext uri="{FF2B5EF4-FFF2-40B4-BE49-F238E27FC236}">
-                <a16:creationId xmlns:a16="http://schemas.microsoft.com/office/drawing/2014/main" xmlns="" id="{D8293616-8A68-674D-9AF3-59F682682722}"/>
+                <a16:creationId xmlns:a16="http://schemas.microsoft.com/office/drawing/2014/main" id="{D8293616-8A68-674D-9AF3-59F682682722}"/>
               </a:ext>
             </a:extLst>
           </p:cNvPr>
@@ -5496,8 +5417,8 @@
         </p:nvSpPr>
         <p:spPr>
           <a:xfrm>
-            <a:off x="2115741" y="3367074"/>
-            <a:ext cx="8447224" cy="3140817"/>
+            <a:off x="947340" y="3367074"/>
+            <a:ext cx="10673160" cy="3140817"/>
           </a:xfrm>
         </p:spPr>
         <p:txBody>
@@ -5513,12 +5434,8 @@
               <a:buNone/>
             </a:pPr>
             <a:r>
-              <a:rPr lang="en-US" sz="4400" dirty="0" smtClean="0"/>
-              <a:t>twitter.com</a:t>
-            </a:r>
-            <a:r>
               <a:rPr lang="en-US" sz="4400" dirty="0"/>
-              <a:t>/@</a:t>
+              <a:t>twitter.com/@</a:t>
             </a:r>
             <a:r>
               <a:rPr lang="en-US" sz="4400" dirty="0" err="1"/>
@@ -5534,14 +5451,14 @@
               <a:buNone/>
             </a:pPr>
             <a:r>
-              <a:rPr lang="en-US" sz="4400" dirty="0" smtClean="0"/>
+              <a:rPr lang="en-US" sz="4400" dirty="0"/>
               <a:t>linkedin.com/in/</a:t>
             </a:r>
             <a:r>
-              <a:rPr lang="en-US" sz="4400" dirty="0" err="1" smtClean="0"/>
+              <a:rPr lang="en-US" sz="4400" dirty="0" err="1"/>
               <a:t>DrOzTurk</a:t>
             </a:r>
-            <a:endParaRPr lang="en-US" sz="4400" dirty="0" smtClean="0"/>
+            <a:endParaRPr lang="en-US" sz="4400" dirty="0"/>
           </a:p>
           <a:p>
             <a:pPr>
@@ -5551,14 +5468,14 @@
               <a:buNone/>
             </a:pPr>
             <a:r>
-              <a:rPr lang="en-US" sz="4400" dirty="0" smtClean="0"/>
-              <a:t>github.com/</a:t>
-            </a:r>
-            <a:r>
-              <a:rPr lang="en-US" sz="4400" dirty="0" err="1" smtClean="0"/>
-              <a:t>DataSciencePros</a:t>
-            </a:r>
-            <a:endParaRPr lang="en-US" sz="4400" dirty="0" smtClean="0"/>
+              <a:rPr lang="en-US" sz="4400" dirty="0"/>
+              <a:t>github.com/DataSciencePros/</a:t>
+            </a:r>
+            <a:r>
+              <a:rPr lang="en-US" sz="4400" dirty="0" err="1"/>
+              <a:t>datascicon.tech</a:t>
+            </a:r>
+            <a:endParaRPr lang="en-US" sz="4400" dirty="0"/>
           </a:p>
           <a:p>
             <a:pPr>
@@ -5567,7 +5484,11 @@
               </a:spcBef>
               <a:buNone/>
             </a:pPr>
-            <a:endParaRPr lang="en-US" dirty="0" smtClean="0">
+            <a:r>
+              <a:rPr lang="en-US" sz="4400" dirty="0"/>
+              <a:t>Follow README.md instructions</a:t>
+            </a:r>
+            <a:endParaRPr lang="en-US" dirty="0">
               <a:solidFill>
                 <a:srgbClr val="FF0000"/>
               </a:solidFill>
@@ -5581,14 +5502,14 @@
               <a:buNone/>
             </a:pPr>
             <a:r>
-              <a:rPr lang="en-US" dirty="0" smtClean="0">
+              <a:rPr lang="en-US" dirty="0">
                 <a:solidFill>
                   <a:srgbClr val="FF0000"/>
                 </a:solidFill>
               </a:rPr>
               <a:t>To download these slides:</a:t>
             </a:r>
-            <a:endParaRPr lang="en-US" sz="4400" dirty="0" smtClean="0">
+            <a:endParaRPr lang="en-US" sz="4400" dirty="0">
               <a:solidFill>
                 <a:srgbClr val="FF0000"/>
               </a:solidFill>
@@ -5602,7 +5523,7 @@
               <a:buNone/>
             </a:pPr>
             <a:r>
-              <a:rPr lang="en-US" sz="4400" dirty="0" smtClean="0">
+              <a:rPr lang="en-US" sz="4400" dirty="0">
                 <a:solidFill>
                   <a:srgbClr val="FF0000"/>
                 </a:solidFill>
@@ -5610,7 +5531,7 @@
               <a:t>tinyurl.com/</a:t>
             </a:r>
             <a:r>
-              <a:rPr lang="en-US" sz="4400" dirty="0" err="1" smtClean="0">
+              <a:rPr lang="en-US" sz="4400" dirty="0" err="1">
                 <a:solidFill>
                   <a:srgbClr val="FF0000"/>
                 </a:solidFill>
@@ -5630,7 +5551,7 @@
           <p:cNvPr id="4" name="Picture 3">
             <a:extLst>
               <a:ext uri="{FF2B5EF4-FFF2-40B4-BE49-F238E27FC236}">
-                <a16:creationId xmlns:a16="http://schemas.microsoft.com/office/drawing/2014/main" xmlns="" id="{3FACDBA0-E167-0E43-B7BB-71A1B653FCC2}"/>
+                <a16:creationId xmlns:a16="http://schemas.microsoft.com/office/drawing/2014/main" id="{3FACDBA0-E167-0E43-B7BB-71A1B653FCC2}"/>
               </a:ext>
             </a:extLst>
           </p:cNvPr>
@@ -5660,7 +5581,7 @@
           <p:cNvPr id="8" name="Shape 26">
             <a:extLst>
               <a:ext uri="{FF2B5EF4-FFF2-40B4-BE49-F238E27FC236}">
-                <a16:creationId xmlns:a16="http://schemas.microsoft.com/office/drawing/2014/main" xmlns="" id="{FA13E736-97B0-AC49-B56C-186D8875FBE4}"/>
+                <a16:creationId xmlns:a16="http://schemas.microsoft.com/office/drawing/2014/main" id="{FA13E736-97B0-AC49-B56C-186D8875FBE4}"/>
               </a:ext>
             </a:extLst>
           </p:cNvPr>
@@ -5677,7 +5598,7 @@
         </p:blipFill>
         <p:spPr>
           <a:xfrm>
-            <a:off x="1632016" y="3471829"/>
+            <a:off x="463616" y="3471829"/>
             <a:ext cx="483725" cy="483725"/>
           </a:xfrm>
           <a:prstGeom prst="rect">
@@ -5694,7 +5615,7 @@
           <p:cNvPr id="9" name="Shape 27">
             <a:extLst>
               <a:ext uri="{FF2B5EF4-FFF2-40B4-BE49-F238E27FC236}">
-                <a16:creationId xmlns:a16="http://schemas.microsoft.com/office/drawing/2014/main" xmlns="" id="{3E0D23A0-A034-6247-A71C-A3EEA89309F5}"/>
+                <a16:creationId xmlns:a16="http://schemas.microsoft.com/office/drawing/2014/main" id="{3E0D23A0-A034-6247-A71C-A3EEA89309F5}"/>
               </a:ext>
             </a:extLst>
           </p:cNvPr>
@@ -5711,7 +5632,7 @@
         </p:blipFill>
         <p:spPr>
           <a:xfrm>
-            <a:off x="1595142" y="4070775"/>
+            <a:off x="426742" y="4070775"/>
             <a:ext cx="557475" cy="557475"/>
           </a:xfrm>
           <a:prstGeom prst="rect">
@@ -5728,7 +5649,7 @@
           <p:cNvPr id="10" name="Content Placeholder 2">
             <a:extLst>
               <a:ext uri="{FF2B5EF4-FFF2-40B4-BE49-F238E27FC236}">
-                <a16:creationId xmlns:a16="http://schemas.microsoft.com/office/drawing/2014/main" xmlns="" id="{700F39A1-33E7-0E47-B1CB-9BD6C9C33515}"/>
+                <a16:creationId xmlns:a16="http://schemas.microsoft.com/office/drawing/2014/main" id="{700F39A1-33E7-0E47-B1CB-9BD6C9C33515}"/>
               </a:ext>
             </a:extLst>
           </p:cNvPr>
@@ -5949,12 +5870,8 @@
               <a:buNone/>
             </a:pPr>
             <a:r>
-              <a:rPr lang="en-US" sz="3200" dirty="0" smtClean="0"/>
-              <a:t>Data </a:t>
-            </a:r>
-            <a:r>
               <a:rPr lang="en-US" sz="3200" dirty="0"/>
-              <a:t>Scientist</a:t>
+              <a:t>Data Scientist</a:t>
             </a:r>
           </a:p>
           <a:p>
@@ -5967,13 +5884,8 @@
             </a:pPr>
             <a:r>
               <a:rPr lang="en-US" sz="3200" dirty="0"/>
-              <a:t> </a:t>
-            </a:r>
-            <a:r>
-              <a:rPr lang="en-US" sz="3200" dirty="0" smtClean="0"/>
-              <a:t>at</a:t>
-            </a:r>
-            <a:endParaRPr lang="en-US" sz="3200" dirty="0"/>
+              <a:t> at</a:t>
+            </a:r>
           </a:p>
           <a:p>
             <a:endParaRPr lang="en-US" sz="2000" dirty="0"/>
@@ -6026,13 +5938,6 @@
       </p:transition>
     </mc:Fallback>
   </mc:AlternateContent>
-  <p:timing>
-    <p:tnLst>
-      <p:par>
-        <p:cTn id="1" dur="indefinite" restart="never" nodeType="tmRoot"/>
-      </p:par>
-    </p:tnLst>
-  </p:timing>
 </p:sld>
 </file>
 
@@ -6058,7 +5963,7 @@
           <p:cNvPr id="2" name="Title 1">
             <a:extLst>
               <a:ext uri="{FF2B5EF4-FFF2-40B4-BE49-F238E27FC236}">
-                <a16:creationId xmlns:a16="http://schemas.microsoft.com/office/drawing/2014/main" xmlns="" id="{3BEE08CC-2275-5C4C-99C6-A9E6FAC03DC9}"/>
+                <a16:creationId xmlns:a16="http://schemas.microsoft.com/office/drawing/2014/main" id="{3BEE08CC-2275-5C4C-99C6-A9E6FAC03DC9}"/>
               </a:ext>
             </a:extLst>
           </p:cNvPr>
@@ -6093,7 +5998,7 @@
           <p:cNvPr id="3" name="Content Placeholder 2">
             <a:extLst>
               <a:ext uri="{FF2B5EF4-FFF2-40B4-BE49-F238E27FC236}">
-                <a16:creationId xmlns:a16="http://schemas.microsoft.com/office/drawing/2014/main" xmlns="" id="{B7A8D63E-FE0F-7147-8297-222B1C7FD895}"/>
+                <a16:creationId xmlns:a16="http://schemas.microsoft.com/office/drawing/2014/main" id="{B7A8D63E-FE0F-7147-8297-222B1C7FD895}"/>
               </a:ext>
             </a:extLst>
           </p:cNvPr>
@@ -6140,7 +6045,7 @@
           <p:cNvPr id="7" name="Picture 6">
             <a:extLst>
               <a:ext uri="{FF2B5EF4-FFF2-40B4-BE49-F238E27FC236}">
-                <a16:creationId xmlns:a16="http://schemas.microsoft.com/office/drawing/2014/main" xmlns="" id="{08D87091-16D6-5B4E-B5B8-DF0DB49FE2C9}"/>
+                <a16:creationId xmlns:a16="http://schemas.microsoft.com/office/drawing/2014/main" id="{08D87091-16D6-5B4E-B5B8-DF0DB49FE2C9}"/>
               </a:ext>
             </a:extLst>
           </p:cNvPr>
@@ -6170,7 +6075,7 @@
           <p:cNvPr id="8" name="Picture 7">
             <a:extLst>
               <a:ext uri="{FF2B5EF4-FFF2-40B4-BE49-F238E27FC236}">
-                <a16:creationId xmlns:a16="http://schemas.microsoft.com/office/drawing/2014/main" xmlns="" id="{12389330-A6AC-3B4D-9FEA-0F0DFF610BAF}"/>
+                <a16:creationId xmlns:a16="http://schemas.microsoft.com/office/drawing/2014/main" id="{12389330-A6AC-3B4D-9FEA-0F0DFF610BAF}"/>
               </a:ext>
             </a:extLst>
           </p:cNvPr>
@@ -6217,13 +6122,6 @@
       </p:transition>
     </mc:Fallback>
   </mc:AlternateContent>
-  <p:timing>
-    <p:tnLst>
-      <p:par>
-        <p:cTn id="1" dur="indefinite" restart="never" nodeType="tmRoot"/>
-      </p:par>
-    </p:tnLst>
-  </p:timing>
 </p:sld>
 </file>
 
@@ -6249,7 +6147,7 @@
           <p:cNvPr id="2" name="Title 1">
             <a:extLst>
               <a:ext uri="{FF2B5EF4-FFF2-40B4-BE49-F238E27FC236}">
-                <a16:creationId xmlns="" xmlns:a16="http://schemas.microsoft.com/office/drawing/2014/main" id="{F6CEF4E7-5884-CE45-B8D8-07A6AF69CA2C}"/>
+                <a16:creationId xmlns:a16="http://schemas.microsoft.com/office/drawing/2014/main" id="{F6CEF4E7-5884-CE45-B8D8-07A6AF69CA2C}"/>
               </a:ext>
             </a:extLst>
           </p:cNvPr>
@@ -6286,7 +6184,7 @@
           <p:cNvPr id="3" name="Content Placeholder 2">
             <a:extLst>
               <a:ext uri="{FF2B5EF4-FFF2-40B4-BE49-F238E27FC236}">
-                <a16:creationId xmlns="" xmlns:a16="http://schemas.microsoft.com/office/drawing/2014/main" id="{5EE90B8F-230C-B741-95CD-EC713101514D}"/>
+                <a16:creationId xmlns:a16="http://schemas.microsoft.com/office/drawing/2014/main" id="{5EE90B8F-230C-B741-95CD-EC713101514D}"/>
               </a:ext>
             </a:extLst>
           </p:cNvPr>
@@ -6366,7 +6264,7 @@
           <p:cNvPr id="5" name="Footer Placeholder 4">
             <a:extLst>
               <a:ext uri="{FF2B5EF4-FFF2-40B4-BE49-F238E27FC236}">
-                <a16:creationId xmlns="" xmlns:a16="http://schemas.microsoft.com/office/drawing/2014/main" id="{4B8F6E83-3EFB-CD47-85BE-6EAAEC482513}"/>
+                <a16:creationId xmlns:a16="http://schemas.microsoft.com/office/drawing/2014/main" id="{4B8F6E83-3EFB-CD47-85BE-6EAAEC482513}"/>
               </a:ext>
             </a:extLst>
           </p:cNvPr>
@@ -6396,13 +6294,6 @@
   <p:clrMapOvr>
     <a:masterClrMapping/>
   </p:clrMapOvr>
-  <p:timing>
-    <p:tnLst>
-      <p:par>
-        <p:cTn id="1" dur="indefinite" restart="never" nodeType="tmRoot"/>
-      </p:par>
-    </p:tnLst>
-  </p:timing>
 </p:sld>
 </file>
 
@@ -6428,7 +6319,7 @@
           <p:cNvPr id="2" name="Title 1">
             <a:extLst>
               <a:ext uri="{FF2B5EF4-FFF2-40B4-BE49-F238E27FC236}">
-                <a16:creationId xmlns="" xmlns:a16="http://schemas.microsoft.com/office/drawing/2014/main" id="{F6CEF4E7-5884-CE45-B8D8-07A6AF69CA2C}"/>
+                <a16:creationId xmlns:a16="http://schemas.microsoft.com/office/drawing/2014/main" id="{F6CEF4E7-5884-CE45-B8D8-07A6AF69CA2C}"/>
               </a:ext>
             </a:extLst>
           </p:cNvPr>
@@ -6465,7 +6356,7 @@
           <p:cNvPr id="3" name="Content Placeholder 2">
             <a:extLst>
               <a:ext uri="{FF2B5EF4-FFF2-40B4-BE49-F238E27FC236}">
-                <a16:creationId xmlns="" xmlns:a16="http://schemas.microsoft.com/office/drawing/2014/main" id="{5EE90B8F-230C-B741-95CD-EC713101514D}"/>
+                <a16:creationId xmlns:a16="http://schemas.microsoft.com/office/drawing/2014/main" id="{5EE90B8F-230C-B741-95CD-EC713101514D}"/>
               </a:ext>
             </a:extLst>
           </p:cNvPr>
@@ -6560,7 +6451,7 @@
           <p:cNvPr id="4" name="Footer Placeholder 3">
             <a:extLst>
               <a:ext uri="{FF2B5EF4-FFF2-40B4-BE49-F238E27FC236}">
-                <a16:creationId xmlns="" xmlns:a16="http://schemas.microsoft.com/office/drawing/2014/main" id="{A4F31F83-AA32-1F48-BCEE-C1630FE49A9E}"/>
+                <a16:creationId xmlns:a16="http://schemas.microsoft.com/office/drawing/2014/main" id="{A4F31F83-AA32-1F48-BCEE-C1630FE49A9E}"/>
               </a:ext>
             </a:extLst>
           </p:cNvPr>
@@ -6590,13 +6481,6 @@
   <p:clrMapOvr>
     <a:masterClrMapping/>
   </p:clrMapOvr>
-  <p:timing>
-    <p:tnLst>
-      <p:par>
-        <p:cTn id="1" dur="indefinite" restart="never" nodeType="tmRoot"/>
-      </p:par>
-    </p:tnLst>
-  </p:timing>
 </p:sld>
 </file>
 
@@ -6622,7 +6506,7 @@
           <p:cNvPr id="4" name="Picture 3">
             <a:extLst>
               <a:ext uri="{FF2B5EF4-FFF2-40B4-BE49-F238E27FC236}">
-                <a16:creationId xmlns="" xmlns:a16="http://schemas.microsoft.com/office/drawing/2014/main" id="{7579AF42-A86E-9749-BB22-0A6C67984BD8}"/>
+                <a16:creationId xmlns:a16="http://schemas.microsoft.com/office/drawing/2014/main" id="{7579AF42-A86E-9749-BB22-0A6C67984BD8}"/>
               </a:ext>
             </a:extLst>
           </p:cNvPr>
@@ -6652,7 +6536,7 @@
           <p:cNvPr id="2" name="Footer Placeholder 1">
             <a:extLst>
               <a:ext uri="{FF2B5EF4-FFF2-40B4-BE49-F238E27FC236}">
-                <a16:creationId xmlns="" xmlns:a16="http://schemas.microsoft.com/office/drawing/2014/main" id="{9D571D1E-FAF2-5849-A49D-E2A0AEA919A2}"/>
+                <a16:creationId xmlns:a16="http://schemas.microsoft.com/office/drawing/2014/main" id="{9D571D1E-FAF2-5849-A49D-E2A0AEA919A2}"/>
               </a:ext>
             </a:extLst>
           </p:cNvPr>
@@ -6682,13 +6566,6 @@
   <p:clrMapOvr>
     <a:masterClrMapping/>
   </p:clrMapOvr>
-  <p:timing>
-    <p:tnLst>
-      <p:par>
-        <p:cTn id="1" dur="indefinite" restart="never" nodeType="tmRoot"/>
-      </p:par>
-    </p:tnLst>
-  </p:timing>
 </p:sld>
 </file>
 
@@ -6714,7 +6591,7 @@
           <p:cNvPr id="2" name="Title 1">
             <a:extLst>
               <a:ext uri="{FF2B5EF4-FFF2-40B4-BE49-F238E27FC236}">
-                <a16:creationId xmlns="" xmlns:a16="http://schemas.microsoft.com/office/drawing/2014/main" id="{14584123-95FD-784D-A990-084E0845C512}"/>
+                <a16:creationId xmlns:a16="http://schemas.microsoft.com/office/drawing/2014/main" id="{14584123-95FD-784D-A990-084E0845C512}"/>
               </a:ext>
             </a:extLst>
           </p:cNvPr>
@@ -6744,7 +6621,7 @@
           <p:cNvPr id="3" name="Content Placeholder 2">
             <a:extLst>
               <a:ext uri="{FF2B5EF4-FFF2-40B4-BE49-F238E27FC236}">
-                <a16:creationId xmlns="" xmlns:a16="http://schemas.microsoft.com/office/drawing/2014/main" id="{7E6A66A9-383B-F044-8AA2-8D2AAC6AD007}"/>
+                <a16:creationId xmlns:a16="http://schemas.microsoft.com/office/drawing/2014/main" id="{7E6A66A9-383B-F044-8AA2-8D2AAC6AD007}"/>
               </a:ext>
             </a:extLst>
           </p:cNvPr>
@@ -6816,7 +6693,7 @@
           <p:cNvPr id="4" name="Footer Placeholder 3">
             <a:extLst>
               <a:ext uri="{FF2B5EF4-FFF2-40B4-BE49-F238E27FC236}">
-                <a16:creationId xmlns="" xmlns:a16="http://schemas.microsoft.com/office/drawing/2014/main" id="{35C43C2D-2A71-884B-A5ED-5DE336B4D655}"/>
+                <a16:creationId xmlns:a16="http://schemas.microsoft.com/office/drawing/2014/main" id="{35C43C2D-2A71-884B-A5ED-5DE336B4D655}"/>
               </a:ext>
             </a:extLst>
           </p:cNvPr>
@@ -6846,13 +6723,6 @@
   <p:clrMapOvr>
     <a:masterClrMapping/>
   </p:clrMapOvr>
-  <p:timing>
-    <p:tnLst>
-      <p:par>
-        <p:cTn id="1" dur="indefinite" restart="never" nodeType="tmRoot"/>
-      </p:par>
-    </p:tnLst>
-  </p:timing>
 </p:sld>
 </file>
 
@@ -6878,7 +6748,7 @@
           <p:cNvPr id="4" name="Picture 3">
             <a:extLst>
               <a:ext uri="{FF2B5EF4-FFF2-40B4-BE49-F238E27FC236}">
-                <a16:creationId xmlns="" xmlns:a16="http://schemas.microsoft.com/office/drawing/2014/main" id="{59A08273-6615-8C4D-B46D-1C1A489427A1}"/>
+                <a16:creationId xmlns:a16="http://schemas.microsoft.com/office/drawing/2014/main" id="{59A08273-6615-8C4D-B46D-1C1A489427A1}"/>
               </a:ext>
             </a:extLst>
           </p:cNvPr>
@@ -6908,7 +6778,7 @@
           <p:cNvPr id="2" name="Footer Placeholder 1">
             <a:extLst>
               <a:ext uri="{FF2B5EF4-FFF2-40B4-BE49-F238E27FC236}">
-                <a16:creationId xmlns="" xmlns:a16="http://schemas.microsoft.com/office/drawing/2014/main" id="{371F6E2F-4768-544C-8C1A-856A55B4411F}"/>
+                <a16:creationId xmlns:a16="http://schemas.microsoft.com/office/drawing/2014/main" id="{371F6E2F-4768-544C-8C1A-856A55B4411F}"/>
               </a:ext>
             </a:extLst>
           </p:cNvPr>
@@ -6938,13 +6808,6 @@
   <p:clrMapOvr>
     <a:masterClrMapping/>
   </p:clrMapOvr>
-  <p:timing>
-    <p:tnLst>
-      <p:par>
-        <p:cTn id="1" dur="indefinite" restart="never" nodeType="tmRoot"/>
-      </p:par>
-    </p:tnLst>
-  </p:timing>
 </p:sld>
 </file>
 
@@ -6970,7 +6833,7 @@
           <p:cNvPr id="5" name="Rectangle 4">
             <a:extLst>
               <a:ext uri="{FF2B5EF4-FFF2-40B4-BE49-F238E27FC236}">
-                <a16:creationId xmlns="" xmlns:a16="http://schemas.microsoft.com/office/drawing/2014/main" id="{198648BD-C7FB-0848-A14C-189A1F478EE5}"/>
+                <a16:creationId xmlns:a16="http://schemas.microsoft.com/office/drawing/2014/main" id="{198648BD-C7FB-0848-A14C-189A1F478EE5}"/>
               </a:ext>
             </a:extLst>
           </p:cNvPr>
@@ -7039,7 +6902,7 @@
           <p:cNvPr id="1027" name="Picture 3" descr="Move mouse over image">
             <a:extLst>
               <a:ext uri="{FF2B5EF4-FFF2-40B4-BE49-F238E27FC236}">
-                <a16:creationId xmlns="" xmlns:a16="http://schemas.microsoft.com/office/drawing/2014/main" id="{F56DE2F2-3CC1-DD46-B40D-33D21324E57A}"/>
+                <a16:creationId xmlns:a16="http://schemas.microsoft.com/office/drawing/2014/main" id="{F56DE2F2-3CC1-DD46-B40D-33D21324E57A}"/>
               </a:ext>
             </a:extLst>
           </p:cNvPr>
@@ -7086,7 +6949,7 @@
           <p:cNvPr id="6" name="Rectangle 5">
             <a:extLst>
               <a:ext uri="{FF2B5EF4-FFF2-40B4-BE49-F238E27FC236}">
-                <a16:creationId xmlns="" xmlns:a16="http://schemas.microsoft.com/office/drawing/2014/main" id="{C43173BA-CC38-344E-A363-BC965F978D5E}"/>
+                <a16:creationId xmlns:a16="http://schemas.microsoft.com/office/drawing/2014/main" id="{C43173BA-CC38-344E-A363-BC965F978D5E}"/>
               </a:ext>
             </a:extLst>
           </p:cNvPr>
@@ -7166,7 +7029,7 @@
           <p:cNvPr id="2" name="Footer Placeholder 1">
             <a:extLst>
               <a:ext uri="{FF2B5EF4-FFF2-40B4-BE49-F238E27FC236}">
-                <a16:creationId xmlns="" xmlns:a16="http://schemas.microsoft.com/office/drawing/2014/main" id="{90BAD2AB-459E-D649-B024-494B780F958F}"/>
+                <a16:creationId xmlns:a16="http://schemas.microsoft.com/office/drawing/2014/main" id="{90BAD2AB-459E-D649-B024-494B780F958F}"/>
               </a:ext>
             </a:extLst>
           </p:cNvPr>
@@ -7196,13 +7059,6 @@
   <p:clrMapOvr>
     <a:masterClrMapping/>
   </p:clrMapOvr>
-  <p:timing>
-    <p:tnLst>
-      <p:par>
-        <p:cTn id="1" dur="indefinite" restart="never" nodeType="tmRoot"/>
-      </p:par>
-    </p:tnLst>
-  </p:timing>
 </p:sld>
 </file>
 

</xml_diff>